<commit_message>
Added Video to Präsentation
</commit_message>
<xml_diff>
--- a/FIPLY/Dokumente/Präsentation.pptx
+++ b/FIPLY/Dokumente/Präsentation.pptx
@@ -5,7 +5,7 @@
     <p:sldMasterId id="2147483672" r:id="rId1"/>
   </p:sldMasterIdLst>
   <p:notesMasterIdLst>
-    <p:notesMasterId r:id="rId16"/>
+    <p:notesMasterId r:id="rId17"/>
   </p:notesMasterIdLst>
   <p:sldIdLst>
     <p:sldId id="256" r:id="rId2"/>
@@ -16,12 +16,13 @@
     <p:sldId id="258" r:id="rId7"/>
     <p:sldId id="257" r:id="rId8"/>
     <p:sldId id="268" r:id="rId9"/>
-    <p:sldId id="269" r:id="rId10"/>
-    <p:sldId id="270" r:id="rId11"/>
-    <p:sldId id="271" r:id="rId12"/>
-    <p:sldId id="259" r:id="rId13"/>
-    <p:sldId id="261" r:id="rId14"/>
-    <p:sldId id="263" r:id="rId15"/>
+    <p:sldId id="272" r:id="rId10"/>
+    <p:sldId id="269" r:id="rId11"/>
+    <p:sldId id="270" r:id="rId12"/>
+    <p:sldId id="271" r:id="rId13"/>
+    <p:sldId id="259" r:id="rId14"/>
+    <p:sldId id="261" r:id="rId15"/>
+    <p:sldId id="263" r:id="rId16"/>
   </p:sldIdLst>
   <p:sldSz cx="9144000" cy="6858000" type="screen4x3"/>
   <p:notesSz cx="6858000" cy="9144000"/>
@@ -3271,7 +3272,7 @@
           <a:p>
             <a:fld id="{59B6AAFE-1443-4BE4-82C8-3D6D2087F3F5}" type="slidenum">
               <a:rPr lang="de-DE" smtClean="0"/>
-              <a:t>10</a:t>
+              <a:t>11</a:t>
             </a:fld>
             <a:endParaRPr lang="de-DE"/>
           </a:p>
@@ -3355,7 +3356,7 @@
           <a:p>
             <a:fld id="{59B6AAFE-1443-4BE4-82C8-3D6D2087F3F5}" type="slidenum">
               <a:rPr lang="de-DE" smtClean="0"/>
-              <a:t>11</a:t>
+              <a:t>12</a:t>
             </a:fld>
             <a:endParaRPr lang="de-DE"/>
           </a:p>
@@ -7867,6 +7868,197 @@
 </file>
 
 <file path=ppt/slides/slide10.xml><?xml version="1.0" encoding="utf-8"?>
+<p:sld xmlns:a="http://schemas.openxmlformats.org/drawingml/2006/main" xmlns:r="http://schemas.openxmlformats.org/officeDocument/2006/relationships" xmlns:p="http://schemas.openxmlformats.org/presentationml/2006/main" show="0">
+  <p:cSld>
+    <p:spTree>
+      <p:nvGrpSpPr>
+        <p:cNvPr id="1" name=""/>
+        <p:cNvGrpSpPr/>
+        <p:nvPr/>
+      </p:nvGrpSpPr>
+      <p:grpSpPr>
+        <a:xfrm>
+          <a:off x="0" y="0"/>
+          <a:ext cx="0" cy="0"/>
+          <a:chOff x="0" y="0"/>
+          <a:chExt cx="0" cy="0"/>
+        </a:xfrm>
+      </p:grpSpPr>
+      <p:sp>
+        <p:nvSpPr>
+          <p:cNvPr id="3" name="Titel 2"/>
+          <p:cNvSpPr>
+            <a:spLocks noGrp="1"/>
+          </p:cNvSpPr>
+          <p:nvPr>
+            <p:ph type="title"/>
+          </p:nvPr>
+        </p:nvSpPr>
+        <p:spPr/>
+        <p:txBody>
+          <a:bodyPr/>
+          <a:lstStyle/>
+          <a:p>
+            <a:r>
+              <a:rPr lang="de-AT" dirty="0" err="1" smtClean="0"/>
+              <a:t>tRAININGSASSISTENT</a:t>
+            </a:r>
+            <a:endParaRPr lang="de-DE" dirty="0"/>
+          </a:p>
+        </p:txBody>
+      </p:sp>
+      <p:pic>
+        <p:nvPicPr>
+          <p:cNvPr id="3074" name="Picture 2" descr="C:\Users\Andreas\Desktop\Github\2015_fiply\FIPLY\Dokumente\PräsentationBilder\assistant1.png"/>
+          <p:cNvPicPr>
+            <a:picLocks noChangeAspect="1" noChangeArrowheads="1"/>
+          </p:cNvPicPr>
+          <p:nvPr/>
+        </p:nvPicPr>
+        <p:blipFill>
+          <a:blip r:embed="rId2">
+            <a:extLst>
+              <a:ext uri="{28A0092B-C50C-407E-A947-70E740481C1C}">
+                <a14:useLocalDpi xmlns:a14="http://schemas.microsoft.com/office/drawing/2010/main" val="0"/>
+              </a:ext>
+            </a:extLst>
+          </a:blip>
+          <a:srcRect/>
+          <a:stretch>
+            <a:fillRect/>
+          </a:stretch>
+        </p:blipFill>
+        <p:spPr bwMode="auto">
+          <a:xfrm>
+            <a:off x="122504" y="1526901"/>
+            <a:ext cx="2829743" cy="5030655"/>
+          </a:xfrm>
+          <a:prstGeom prst="rect">
+            <a:avLst/>
+          </a:prstGeom>
+          <a:noFill/>
+          <a:extLst>
+            <a:ext uri="{909E8E84-426E-40DD-AFC4-6F175D3DCCD1}">
+              <a14:hiddenFill xmlns:a14="http://schemas.microsoft.com/office/drawing/2010/main">
+                <a:solidFill>
+                  <a:srgbClr val="FFFFFF"/>
+                </a:solidFill>
+              </a14:hiddenFill>
+            </a:ext>
+          </a:extLst>
+        </p:spPr>
+      </p:pic>
+      <p:pic>
+        <p:nvPicPr>
+          <p:cNvPr id="3075" name="Picture 3" descr="C:\Users\Andreas\Desktop\Github\2015_fiply\FIPLY\Dokumente\PräsentationBilder\assistant2.png"/>
+          <p:cNvPicPr>
+            <a:picLocks noChangeAspect="1" noChangeArrowheads="1"/>
+          </p:cNvPicPr>
+          <p:nvPr/>
+        </p:nvPicPr>
+        <p:blipFill>
+          <a:blip r:embed="rId3">
+            <a:extLst>
+              <a:ext uri="{28A0092B-C50C-407E-A947-70E740481C1C}">
+                <a14:useLocalDpi xmlns:a14="http://schemas.microsoft.com/office/drawing/2010/main" val="0"/>
+              </a:ext>
+            </a:extLst>
+          </a:blip>
+          <a:srcRect/>
+          <a:stretch>
+            <a:fillRect/>
+          </a:stretch>
+        </p:blipFill>
+        <p:spPr bwMode="auto">
+          <a:xfrm>
+            <a:off x="3095897" y="1526903"/>
+            <a:ext cx="2934243" cy="5030653"/>
+          </a:xfrm>
+          <a:prstGeom prst="rect">
+            <a:avLst/>
+          </a:prstGeom>
+          <a:noFill/>
+          <a:extLst>
+            <a:ext uri="{909E8E84-426E-40DD-AFC4-6F175D3DCCD1}">
+              <a14:hiddenFill xmlns:a14="http://schemas.microsoft.com/office/drawing/2010/main">
+                <a:solidFill>
+                  <a:srgbClr val="FFFFFF"/>
+                </a:solidFill>
+              </a14:hiddenFill>
+            </a:ext>
+          </a:extLst>
+        </p:spPr>
+      </p:pic>
+      <p:pic>
+        <p:nvPicPr>
+          <p:cNvPr id="3076" name="Picture 4" descr="C:\Users\Andreas\Desktop\Github\2015_fiply\FIPLY\Dokumente\PräsentationBilder\assistant3.png"/>
+          <p:cNvPicPr>
+            <a:picLocks noChangeAspect="1" noChangeArrowheads="1"/>
+          </p:cNvPicPr>
+          <p:nvPr/>
+        </p:nvPicPr>
+        <p:blipFill>
+          <a:blip r:embed="rId4">
+            <a:extLst>
+              <a:ext uri="{28A0092B-C50C-407E-A947-70E740481C1C}">
+                <a14:useLocalDpi xmlns:a14="http://schemas.microsoft.com/office/drawing/2010/main" val="0"/>
+              </a:ext>
+            </a:extLst>
+          </a:blip>
+          <a:srcRect/>
+          <a:stretch>
+            <a:fillRect/>
+          </a:stretch>
+        </p:blipFill>
+        <p:spPr bwMode="auto">
+          <a:xfrm>
+            <a:off x="6165668" y="1526901"/>
+            <a:ext cx="2829742" cy="5030653"/>
+          </a:xfrm>
+          <a:prstGeom prst="rect">
+            <a:avLst/>
+          </a:prstGeom>
+          <a:noFill/>
+          <a:extLst>
+            <a:ext uri="{909E8E84-426E-40DD-AFC4-6F175D3DCCD1}">
+              <a14:hiddenFill xmlns:a14="http://schemas.microsoft.com/office/drawing/2010/main">
+                <a:solidFill>
+                  <a:srgbClr val="FFFFFF"/>
+                </a:solidFill>
+              </a14:hiddenFill>
+            </a:ext>
+          </a:extLst>
+        </p:spPr>
+      </p:pic>
+    </p:spTree>
+    <p:extLst>
+      <p:ext uri="{BB962C8B-B14F-4D97-AF65-F5344CB8AC3E}">
+        <p14:creationId xmlns:p14="http://schemas.microsoft.com/office/powerpoint/2010/main" val="2504116266"/>
+      </p:ext>
+    </p:extLst>
+  </p:cSld>
+  <p:clrMapOvr>
+    <a:masterClrMapping/>
+  </p:clrMapOvr>
+  <mc:AlternateContent xmlns:mc="http://schemas.openxmlformats.org/markup-compatibility/2006" xmlns:p14="http://schemas.microsoft.com/office/powerpoint/2010/main">
+    <mc:Choice Requires="p14">
+      <p:transition spd="slow" p14:dur="2000"/>
+    </mc:Choice>
+    <mc:Fallback xmlns="">
+      <p:transition spd="slow"/>
+    </mc:Fallback>
+  </mc:AlternateContent>
+  <p:timing>
+    <p:tnLst>
+      <p:par>
+        <p:cTn id="1" dur="indefinite" restart="never" nodeType="tmRoot"/>
+      </p:par>
+    </p:tnLst>
+  </p:timing>
+</p:sld>
+</file>
+
+<file path=ppt/slides/slide11.xml><?xml version="1.0" encoding="utf-8"?>
 <p:sld xmlns:a="http://schemas.openxmlformats.org/drawingml/2006/main" xmlns:r="http://schemas.openxmlformats.org/officeDocument/2006/relationships" xmlns:p="http://schemas.openxmlformats.org/presentationml/2006/main">
   <p:cSld>
     <p:spTree>
@@ -8079,7 +8271,7 @@
 </p:sld>
 </file>
 
-<file path=ppt/slides/slide11.xml><?xml version="1.0" encoding="utf-8"?>
+<file path=ppt/slides/slide12.xml><?xml version="1.0" encoding="utf-8"?>
 <p:sld xmlns:a="http://schemas.openxmlformats.org/drawingml/2006/main" xmlns:r="http://schemas.openxmlformats.org/officeDocument/2006/relationships" xmlns:p="http://schemas.openxmlformats.org/presentationml/2006/main">
   <p:cSld>
     <p:spTree>
@@ -8270,7 +8462,7 @@
 </p:sld>
 </file>
 
-<file path=ppt/slides/slide12.xml><?xml version="1.0" encoding="utf-8"?>
+<file path=ppt/slides/slide13.xml><?xml version="1.0" encoding="utf-8"?>
 <p:sld xmlns:a="http://schemas.openxmlformats.org/drawingml/2006/main" xmlns:r="http://schemas.openxmlformats.org/officeDocument/2006/relationships" xmlns:p="http://schemas.openxmlformats.org/presentationml/2006/main" show="0">
   <p:cSld>
     <p:spTree>
@@ -8411,13 +8603,7 @@
               <a:rPr lang="de-DE" dirty="0" smtClean="0">
                 <a:ea typeface="+mn-ea"/>
               </a:rPr>
-              <a:t>Usermanagement &amp; </a:t>
-            </a:r>
-            <a:r>
-              <a:rPr lang="de-DE" dirty="0" smtClean="0">
-                <a:ea typeface="+mn-ea"/>
-              </a:rPr>
-              <a:t>Statistik</a:t>
+              <a:t>Usermanagement &amp; Statistik</a:t>
             </a:r>
           </a:p>
           <a:p>
@@ -8692,11 +8878,11 @@
   <p:clrMapOvr>
     <a:masterClrMapping/>
   </p:clrMapOvr>
-  <mc:AlternateContent xmlns:mc="http://schemas.openxmlformats.org/markup-compatibility/2006">
-    <mc:Choice xmlns:p14="http://schemas.microsoft.com/office/powerpoint/2010/main" Requires="p14">
+  <mc:AlternateContent xmlns:mc="http://schemas.openxmlformats.org/markup-compatibility/2006" xmlns:p14="http://schemas.microsoft.com/office/powerpoint/2010/main">
+    <mc:Choice Requires="p14">
       <p:transition spd="slow" p14:dur="2000"/>
     </mc:Choice>
-    <mc:Fallback>
+    <mc:Fallback xmlns="">
       <p:transition spd="slow"/>
     </mc:Fallback>
   </mc:AlternateContent>
@@ -8710,7 +8896,7 @@
 </p:sld>
 </file>
 
-<file path=ppt/slides/slide13.xml><?xml version="1.0" encoding="utf-8"?>
+<file path=ppt/slides/slide14.xml><?xml version="1.0" encoding="utf-8"?>
 <p:sld xmlns:a="http://schemas.openxmlformats.org/drawingml/2006/main" xmlns:r="http://schemas.openxmlformats.org/officeDocument/2006/relationships" xmlns:p="http://schemas.openxmlformats.org/presentationml/2006/main">
   <p:cSld>
     <p:spTree>
@@ -9016,7 +9202,7 @@
 </p:sld>
 </file>
 
-<file path=ppt/slides/slide14.xml><?xml version="1.0" encoding="utf-8"?>
+<file path=ppt/slides/slide15.xml><?xml version="1.0" encoding="utf-8"?>
 <p:sld xmlns:a="http://schemas.openxmlformats.org/drawingml/2006/main" xmlns:r="http://schemas.openxmlformats.org/officeDocument/2006/relationships" xmlns:p="http://schemas.openxmlformats.org/presentationml/2006/main">
   <p:cSld>
     <p:spTree>
@@ -10630,25 +10816,6 @@
       </p:grpSpPr>
       <p:sp>
         <p:nvSpPr>
-          <p:cNvPr id="2" name="Inhaltsplatzhalter 1"/>
-          <p:cNvSpPr>
-            <a:spLocks noGrp="1"/>
-          </p:cNvSpPr>
-          <p:nvPr>
-            <p:ph idx="1"/>
-          </p:nvPr>
-        </p:nvSpPr>
-        <p:spPr/>
-        <p:txBody>
-          <a:bodyPr/>
-          <a:lstStyle/>
-          <a:p>
-            <a:endParaRPr lang="de-DE" dirty="0"/>
-          </a:p>
-        </p:txBody>
-      </p:sp>
-      <p:sp>
-        <p:nvSpPr>
           <p:cNvPr id="3" name="Titel 2"/>
           <p:cNvSpPr>
             <a:spLocks noGrp="1"/>
@@ -10752,6 +10919,25 @@
           </a:extLst>
         </p:spPr>
       </p:pic>
+      <p:sp>
+        <p:nvSpPr>
+          <p:cNvPr id="7" name="Inhaltsplatzhalter 6"/>
+          <p:cNvSpPr>
+            <a:spLocks noGrp="1"/>
+          </p:cNvSpPr>
+          <p:nvPr>
+            <p:ph idx="1"/>
+          </p:nvPr>
+        </p:nvSpPr>
+        <p:spPr/>
+        <p:txBody>
+          <a:bodyPr/>
+          <a:lstStyle/>
+          <a:p>
+            <a:endParaRPr lang="de-DE"/>
+          </a:p>
+        </p:txBody>
+      </p:sp>
     </p:spTree>
     <p:extLst>
       <p:ext uri="{BB962C8B-B14F-4D97-AF65-F5344CB8AC3E}">
@@ -10773,7 +10959,7 @@
 </file>
 
 <file path=ppt/slides/slide9.xml><?xml version="1.0" encoding="utf-8"?>
-<p:sld xmlns:a="http://schemas.openxmlformats.org/drawingml/2006/main" xmlns:r="http://schemas.openxmlformats.org/officeDocument/2006/relationships" xmlns:p="http://schemas.openxmlformats.org/presentationml/2006/main" show="0">
+<p:sld xmlns:a="http://schemas.openxmlformats.org/drawingml/2006/main" xmlns:r="http://schemas.openxmlformats.org/officeDocument/2006/relationships" xmlns:p="http://schemas.openxmlformats.org/presentationml/2006/main">
   <p:cSld>
     <p:spTree>
       <p:nvGrpSpPr>
@@ -10789,174 +10975,182 @@
           <a:chExt cx="0" cy="0"/>
         </a:xfrm>
       </p:grpSpPr>
-      <p:sp>
-        <p:nvSpPr>
-          <p:cNvPr id="3" name="Titel 2"/>
-          <p:cNvSpPr>
-            <a:spLocks noGrp="1"/>
-          </p:cNvSpPr>
-          <p:nvPr>
-            <p:ph type="title"/>
-          </p:nvPr>
-        </p:nvSpPr>
-        <p:spPr/>
-        <p:txBody>
-          <a:bodyPr/>
-          <a:lstStyle/>
-          <a:p>
-            <a:r>
-              <a:rPr lang="de-AT" dirty="0" err="1" smtClean="0"/>
-              <a:t>tRAININGSASSISTENT</a:t>
-            </a:r>
-            <a:endParaRPr lang="de-DE" dirty="0"/>
-          </a:p>
-        </p:txBody>
-      </p:sp>
       <p:pic>
         <p:nvPicPr>
-          <p:cNvPr id="3074" name="Picture 2" descr="C:\Users\Andreas\Desktop\Github\2015_fiply\FIPLY\Dokumente\PräsentationBilder\assistant1.png"/>
+          <p:cNvPr id="4" name="Liegestütze.mp4">
+            <a:hlinkClick r:id="" action="ppaction://media"/>
+          </p:cNvPr>
           <p:cNvPicPr>
-            <a:picLocks noChangeAspect="1" noChangeArrowheads="1"/>
+            <a:picLocks noGrp="1" noChangeAspect="1"/>
           </p:cNvPicPr>
-          <p:nvPr/>
+          <p:nvPr>
+            <p:ph idx="1"/>
+            <a:videoFile r:link="rId2"/>
+            <p:extLst>
+              <p:ext uri="{DAA4B4D4-6D71-4841-9C94-3DE7FCFB9230}">
+                <p14:media xmlns:p14="http://schemas.microsoft.com/office/powerpoint/2010/main" r:embed="rId1"/>
+              </p:ext>
+            </p:extLst>
+          </p:nvPr>
         </p:nvPicPr>
         <p:blipFill>
-          <a:blip r:embed="rId2">
-            <a:extLst>
-              <a:ext uri="{28A0092B-C50C-407E-A947-70E740481C1C}">
-                <a14:useLocalDpi xmlns:a14="http://schemas.microsoft.com/office/drawing/2010/main" val="0"/>
-              </a:ext>
-            </a:extLst>
-          </a:blip>
-          <a:srcRect/>
+          <a:blip r:embed="rId4"/>
           <a:stretch>
             <a:fillRect/>
           </a:stretch>
         </p:blipFill>
-        <p:spPr bwMode="auto">
+        <p:spPr>
           <a:xfrm>
-            <a:off x="122504" y="1526901"/>
-            <a:ext cx="2829743" cy="5030655"/>
+            <a:off x="-5805" y="1514203"/>
+            <a:ext cx="9149805" cy="5146766"/>
           </a:xfrm>
-          <a:prstGeom prst="rect">
-            <a:avLst/>
-          </a:prstGeom>
-          <a:noFill/>
-          <a:extLst>
-            <a:ext uri="{909E8E84-426E-40DD-AFC4-6F175D3DCCD1}">
-              <a14:hiddenFill xmlns:a14="http://schemas.microsoft.com/office/drawing/2010/main">
-                <a:solidFill>
-                  <a:srgbClr val="FFFFFF"/>
-                </a:solidFill>
-              </a14:hiddenFill>
-            </a:ext>
-          </a:extLst>
-        </p:spPr>
-      </p:pic>
-      <p:pic>
-        <p:nvPicPr>
-          <p:cNvPr id="3075" name="Picture 3" descr="C:\Users\Andreas\Desktop\Github\2015_fiply\FIPLY\Dokumente\PräsentationBilder\assistant2.png"/>
-          <p:cNvPicPr>
-            <a:picLocks noChangeAspect="1" noChangeArrowheads="1"/>
-          </p:cNvPicPr>
-          <p:nvPr/>
-        </p:nvPicPr>
-        <p:blipFill>
-          <a:blip r:embed="rId3">
-            <a:extLst>
-              <a:ext uri="{28A0092B-C50C-407E-A947-70E740481C1C}">
-                <a14:useLocalDpi xmlns:a14="http://schemas.microsoft.com/office/drawing/2010/main" val="0"/>
-              </a:ext>
-            </a:extLst>
-          </a:blip>
-          <a:srcRect/>
-          <a:stretch>
-            <a:fillRect/>
-          </a:stretch>
-        </p:blipFill>
-        <p:spPr bwMode="auto">
-          <a:xfrm>
-            <a:off x="3095897" y="1526903"/>
-            <a:ext cx="2934243" cy="5030653"/>
-          </a:xfrm>
-          <a:prstGeom prst="rect">
-            <a:avLst/>
-          </a:prstGeom>
-          <a:noFill/>
-          <a:extLst>
-            <a:ext uri="{909E8E84-426E-40DD-AFC4-6F175D3DCCD1}">
-              <a14:hiddenFill xmlns:a14="http://schemas.microsoft.com/office/drawing/2010/main">
-                <a:solidFill>
-                  <a:srgbClr val="FFFFFF"/>
-                </a:solidFill>
-              </a14:hiddenFill>
-            </a:ext>
-          </a:extLst>
-        </p:spPr>
-      </p:pic>
-      <p:pic>
-        <p:nvPicPr>
-          <p:cNvPr id="3076" name="Picture 4" descr="C:\Users\Andreas\Desktop\Github\2015_fiply\FIPLY\Dokumente\PräsentationBilder\assistant3.png"/>
-          <p:cNvPicPr>
-            <a:picLocks noChangeAspect="1" noChangeArrowheads="1"/>
-          </p:cNvPicPr>
-          <p:nvPr/>
-        </p:nvPicPr>
-        <p:blipFill>
-          <a:blip r:embed="rId4">
-            <a:extLst>
-              <a:ext uri="{28A0092B-C50C-407E-A947-70E740481C1C}">
-                <a14:useLocalDpi xmlns:a14="http://schemas.microsoft.com/office/drawing/2010/main" val="0"/>
-              </a:ext>
-            </a:extLst>
-          </a:blip>
-          <a:srcRect/>
-          <a:stretch>
-            <a:fillRect/>
-          </a:stretch>
-        </p:blipFill>
-        <p:spPr bwMode="auto">
-          <a:xfrm>
-            <a:off x="6165668" y="1526901"/>
-            <a:ext cx="2829742" cy="5030653"/>
-          </a:xfrm>
-          <a:prstGeom prst="rect">
-            <a:avLst/>
-          </a:prstGeom>
-          <a:noFill/>
-          <a:extLst>
-            <a:ext uri="{909E8E84-426E-40DD-AFC4-6F175D3DCCD1}">
-              <a14:hiddenFill xmlns:a14="http://schemas.microsoft.com/office/drawing/2010/main">
-                <a:solidFill>
-                  <a:srgbClr val="FFFFFF"/>
-                </a:solidFill>
-              </a14:hiddenFill>
-            </a:ext>
-          </a:extLst>
         </p:spPr>
       </p:pic>
     </p:spTree>
     <p:extLst>
       <p:ext uri="{BB962C8B-B14F-4D97-AF65-F5344CB8AC3E}">
-        <p14:creationId xmlns:p14="http://schemas.microsoft.com/office/powerpoint/2010/main" val="2504116266"/>
+        <p14:creationId xmlns:p14="http://schemas.microsoft.com/office/powerpoint/2010/main" val="3228452621"/>
       </p:ext>
     </p:extLst>
   </p:cSld>
   <p:clrMapOvr>
     <a:masterClrMapping/>
   </p:clrMapOvr>
-  <mc:AlternateContent xmlns:mc="http://schemas.openxmlformats.org/markup-compatibility/2006">
-    <mc:Choice xmlns:p14="http://schemas.microsoft.com/office/powerpoint/2010/main" Requires="p14">
-      <p:transition spd="slow" p14:dur="2000"/>
-    </mc:Choice>
-    <mc:Fallback>
-      <p:transition spd="slow"/>
-    </mc:Fallback>
-  </mc:AlternateContent>
   <p:timing>
     <p:tnLst>
       <p:par>
-        <p:cTn id="1" dur="indefinite" restart="never" nodeType="tmRoot"/>
+        <p:cTn id="1" dur="indefinite" restart="never" nodeType="tmRoot">
+          <p:childTnLst>
+            <p:seq concurrent="1" nextAc="seek">
+              <p:cTn id="2" dur="indefinite" nodeType="mainSeq">
+                <p:childTnLst>
+                  <p:par>
+                    <p:cTn id="3" fill="hold">
+                      <p:stCondLst>
+                        <p:cond delay="indefinite"/>
+                        <p:cond evt="onBegin" delay="0">
+                          <p:tn val="2"/>
+                        </p:cond>
+                      </p:stCondLst>
+                      <p:childTnLst>
+                        <p:par>
+                          <p:cTn id="4" fill="hold">
+                            <p:stCondLst>
+                              <p:cond delay="0"/>
+                            </p:stCondLst>
+                            <p:childTnLst>
+                              <p:par>
+                                <p:cTn id="5" presetID="1" presetClass="mediacall" presetSubtype="0" fill="hold" nodeType="afterEffect">
+                                  <p:stCondLst>
+                                    <p:cond delay="0"/>
+                                  </p:stCondLst>
+                                  <p:childTnLst>
+                                    <p:cmd type="call" cmd="playFrom(0.0)">
+                                      <p:cBhvr>
+                                        <p:cTn id="6" dur="7733" fill="hold"/>
+                                        <p:tgtEl>
+                                          <p:spTgt spid="4"/>
+                                        </p:tgtEl>
+                                      </p:cBhvr>
+                                    </p:cmd>
+                                  </p:childTnLst>
+                                </p:cTn>
+                              </p:par>
+                            </p:childTnLst>
+                          </p:cTn>
+                        </p:par>
+                      </p:childTnLst>
+                    </p:cTn>
+                  </p:par>
+                </p:childTnLst>
+              </p:cTn>
+              <p:prevCondLst>
+                <p:cond evt="onPrev" delay="0">
+                  <p:tgtEl>
+                    <p:sldTgt/>
+                  </p:tgtEl>
+                </p:cond>
+              </p:prevCondLst>
+              <p:nextCondLst>
+                <p:cond evt="onNext" delay="0">
+                  <p:tgtEl>
+                    <p:sldTgt/>
+                  </p:tgtEl>
+                </p:cond>
+              </p:nextCondLst>
+            </p:seq>
+            <p:video>
+              <p:cMediaNode vol="80000">
+                <p:cTn id="7" fill="hold" display="0">
+                  <p:stCondLst>
+                    <p:cond delay="indefinite"/>
+                  </p:stCondLst>
+                </p:cTn>
+                <p:tgtEl>
+                  <p:spTgt spid="4"/>
+                </p:tgtEl>
+              </p:cMediaNode>
+            </p:video>
+            <p:seq concurrent="1" nextAc="seek">
+              <p:cTn id="8" restart="whenNotActive" fill="hold" evtFilter="cancelBubble" nodeType="interactiveSeq">
+                <p:stCondLst>
+                  <p:cond evt="onClick" delay="0">
+                    <p:tgtEl>
+                      <p:spTgt spid="4"/>
+                    </p:tgtEl>
+                  </p:cond>
+                </p:stCondLst>
+                <p:endSync evt="end" delay="0">
+                  <p:rtn val="all"/>
+                </p:endSync>
+                <p:childTnLst>
+                  <p:par>
+                    <p:cTn id="9" fill="hold">
+                      <p:stCondLst>
+                        <p:cond delay="0"/>
+                      </p:stCondLst>
+                      <p:childTnLst>
+                        <p:par>
+                          <p:cTn id="10" fill="hold">
+                            <p:stCondLst>
+                              <p:cond delay="0"/>
+                            </p:stCondLst>
+                            <p:childTnLst>
+                              <p:par>
+                                <p:cTn id="11" presetID="2" presetClass="mediacall" presetSubtype="0" fill="hold" nodeType="clickEffect">
+                                  <p:stCondLst>
+                                    <p:cond delay="0"/>
+                                  </p:stCondLst>
+                                  <p:childTnLst>
+                                    <p:cmd type="call" cmd="togglePause">
+                                      <p:cBhvr>
+                                        <p:cTn id="12" dur="1" fill="hold"/>
+                                        <p:tgtEl>
+                                          <p:spTgt spid="4"/>
+                                        </p:tgtEl>
+                                      </p:cBhvr>
+                                    </p:cmd>
+                                  </p:childTnLst>
+                                </p:cTn>
+                              </p:par>
+                            </p:childTnLst>
+                          </p:cTn>
+                        </p:par>
+                      </p:childTnLst>
+                    </p:cTn>
+                  </p:par>
+                </p:childTnLst>
+              </p:cTn>
+              <p:nextCondLst>
+                <p:cond evt="onClick" delay="0">
+                  <p:tgtEl>
+                    <p:spTgt spid="4"/>
+                  </p:tgtEl>
+                </p:cond>
+              </p:nextCondLst>
+            </p:seq>
+          </p:childTnLst>
+        </p:cTn>
       </p:par>
     </p:tnLst>
   </p:timing>

</xml_diff>